<commit_message>
vista inicio creación visitas
</commit_message>
<xml_diff>
--- a/protected/controllers/test.php.pptx
+++ b/protected/controllers/test.php.pptx
@@ -6,6 +6,7 @@
   </p:sldMasterIdLst>
   <p:sldIdLst>
     <p:sldId id="256" r:id="rId3"/>
+    <p:sldId id="257" r:id="rId4"/>
   </p:sldIdLst>
   <p:sldSz cx="9144000" cy="6858000" type="screen4x3"/>
   <p:notesSz cx="6858000" cy="9144000"/>
@@ -3011,6 +3012,62 @@
 </p:sld>
 </file>
 
+<file path=ppt/slides/slide2.xml><?xml version="1.0" encoding="utf-8"?>
+<p:sld xmlns:a="http://schemas.openxmlformats.org/drawingml/2006/main" xmlns:r="http://schemas.openxmlformats.org/officeDocument/2006/relationships" xmlns:p="http://schemas.openxmlformats.org/presentationml/2006/main">
+  <p:cSld>
+    <p:spTree>
+      <p:nvGrpSpPr>
+        <p:cNvPr id="1" name=""/>
+        <p:cNvGrpSpPr/>
+        <p:nvPr/>
+      </p:nvGrpSpPr>
+      <p:grpSpPr>
+        <a:xfrm>
+          <a:off x="0" y="0"/>
+          <a:ext cx="0" cy="0"/>
+          <a:chOff x="0" y="0"/>
+          <a:chExt cx="0" cy="0"/>
+        </a:xfrm>
+      </p:grpSpPr>
+      <p:pic>
+        <p:nvPicPr>
+          <p:cNvPr id="1" name="PHPPowerPoint logo" descr="PHPPowerPoint logo"/>
+          <p:cNvPicPr>
+            <a:picLocks noChangeAspect="1"/>
+          </p:cNvPicPr>
+          <p:nvPr/>
+        </p:nvPicPr>
+        <p:blipFill>
+          <a:blip r:embed="rId2"/>
+          <a:stretch>
+            <a:fillRect/>
+          </a:stretch>
+        </p:blipFill>
+        <p:spPr>
+          <a:xfrm rot="0">
+            <a:off x="95250" y="95250"/>
+            <a:ext cx="2352675" cy="342900"/>
+          </a:xfrm>
+          <a:prstGeom prst="rect">
+            <a:avLst/>
+          </a:prstGeom>
+          <a:effectLst>
+            <a:outerShdw blurRad="57150" dist="95250" dir="2700000" algn="br" rotWithShape="0">
+              <a:srgbClr val="000000">
+                <a:alpha val="50000"/>
+              </a:srgbClr>
+            </a:outerShdw>
+          </a:effectLst>
+        </p:spPr>
+      </p:pic>
+    </p:spTree>
+  </p:cSld>
+  <p:clrMapOvr>
+    <a:masterClrMapping/>
+  </p:clrMapOvr>
+</p:sld>
+</file>
+
 <file path=ppt/theme/theme1.xml><?xml version="1.0" encoding="utf-8"?>
 <a:theme xmlns:a="http://schemas.openxmlformats.org/drawingml/2006/main" name="Office Theme">
   <a:themeElements>

</xml_diff>